<commit_message>
docs update final b4 mtg
</commit_message>
<xml_diff>
--- a/docs/WIP/CASA_May4_v2.pptx
+++ b/docs/WIP/CASA_May4_v2.pptx
@@ -28,22 +28,22 @@
   <p:notesSz cx="6797675" cy="9926638"/>
   <p:embeddedFontLst>
     <p:embeddedFont>
-      <p:font typeface="Technika-Bold" panose="00000600000000000000" charset="-18"/>
+      <p:font typeface="Technika" panose="020B0604020202020204" charset="-18"/>
       <p:regular r:id="rId18"/>
+      <p:bold r:id="rId19"/>
+      <p:italic r:id="rId20"/>
+      <p:boldItalic r:id="rId21"/>
     </p:embeddedFont>
     <p:embeddedFont>
       <p:font typeface="Calibri" panose="020F0502020204030204" pitchFamily="34" charset="0"/>
-      <p:regular r:id="rId19"/>
-      <p:bold r:id="rId20"/>
-      <p:italic r:id="rId21"/>
-      <p:boldItalic r:id="rId22"/>
+      <p:regular r:id="rId22"/>
+      <p:bold r:id="rId23"/>
+      <p:italic r:id="rId24"/>
+      <p:boldItalic r:id="rId25"/>
     </p:embeddedFont>
     <p:embeddedFont>
-      <p:font typeface="Technika" panose="020B0604020202020204" charset="-18"/>
-      <p:regular r:id="rId23"/>
-      <p:bold r:id="rId24"/>
-      <p:italic r:id="rId25"/>
-      <p:boldItalic r:id="rId26"/>
+      <p:font typeface="Technika-Bold" panose="00000600000000000000" charset="-18"/>
+      <p:regular r:id="rId26"/>
     </p:embeddedFont>
   </p:embeddedFontLst>
   <p:custDataLst>
@@ -785,7 +785,7 @@
           <a:graphicData uri="http://schemas.openxmlformats.org/presentationml/2006/ole">
             <mc:AlternateContent xmlns:mc="http://schemas.openxmlformats.org/markup-compatibility/2006">
               <mc:Choice xmlns:v="urn:schemas-microsoft-com:vml" Requires="v">
-                <p:oleObj spid="_x0000_s25648" name="think-cell Slide" r:id="rId4" imgW="270" imgH="270" progId="TCLayout.ActiveDocument.1">
+                <p:oleObj spid="_x0000_s25649" name="think-cell Slide" r:id="rId4" imgW="270" imgH="270" progId="TCLayout.ActiveDocument.1">
                   <p:embed/>
                 </p:oleObj>
               </mc:Choice>
@@ -1413,7 +1413,7 @@
           <a:graphicData uri="http://schemas.openxmlformats.org/presentationml/2006/ole">
             <mc:AlternateContent xmlns:mc="http://schemas.openxmlformats.org/markup-compatibility/2006">
               <mc:Choice xmlns:v="urn:schemas-microsoft-com:vml" Requires="v">
-                <p:oleObj spid="_x0000_s1145" name="think-cell Slide" r:id="rId9" imgW="270" imgH="270" progId="TCLayout.ActiveDocument.1">
+                <p:oleObj spid="_x0000_s1146" name="think-cell Slide" r:id="rId9" imgW="270" imgH="270" progId="TCLayout.ActiveDocument.1">
                   <p:embed/>
                 </p:oleObj>
               </mc:Choice>
@@ -2240,7 +2240,7 @@
           <a:graphicData uri="http://schemas.openxmlformats.org/presentationml/2006/ole">
             <mc:AlternateContent xmlns:mc="http://schemas.openxmlformats.org/markup-compatibility/2006">
               <mc:Choice xmlns:v="urn:schemas-microsoft-com:vml" Requires="v">
-                <p:oleObj spid="_x0000_s35866" name="think-cell Slide" r:id="rId5" imgW="270" imgH="270" progId="TCLayout.ActiveDocument.1">
+                <p:oleObj spid="_x0000_s35867" name="think-cell Slide" r:id="rId5" imgW="270" imgH="270" progId="TCLayout.ActiveDocument.1">
                   <p:embed/>
                 </p:oleObj>
               </mc:Choice>
@@ -5587,7 +5587,7 @@
           <a:graphicData uri="http://schemas.openxmlformats.org/presentationml/2006/ole">
             <mc:AlternateContent xmlns:mc="http://schemas.openxmlformats.org/markup-compatibility/2006">
               <mc:Choice xmlns:v="urn:schemas-microsoft-com:vml" Requires="v">
-                <p:oleObj spid="_x0000_s34858" name="think-cell Slide" r:id="rId5" imgW="270" imgH="270" progId="TCLayout.ActiveDocument.1">
+                <p:oleObj spid="_x0000_s34859" name="think-cell Slide" r:id="rId5" imgW="270" imgH="270" progId="TCLayout.ActiveDocument.1">
                   <p:embed/>
                 </p:oleObj>
               </mc:Choice>
@@ -8164,7 +8164,7 @@
           <a:graphicData uri="http://schemas.openxmlformats.org/presentationml/2006/ole">
             <mc:AlternateContent xmlns:mc="http://schemas.openxmlformats.org/markup-compatibility/2006">
               <mc:Choice xmlns:v="urn:schemas-microsoft-com:vml" Requires="v">
-                <p:oleObj spid="_x0000_s40978" name="think-cell Slide" r:id="rId5" imgW="270" imgH="270" progId="TCLayout.ActiveDocument.1">
+                <p:oleObj spid="_x0000_s40979" name="think-cell Slide" r:id="rId5" imgW="270" imgH="270" progId="TCLayout.ActiveDocument.1">
                   <p:embed/>
                 </p:oleObj>
               </mc:Choice>
@@ -10786,7 +10786,7 @@
           <a:graphicData uri="http://schemas.openxmlformats.org/presentationml/2006/ole">
             <mc:AlternateContent xmlns:mc="http://schemas.openxmlformats.org/markup-compatibility/2006">
               <mc:Choice xmlns:v="urn:schemas-microsoft-com:vml" Requires="v">
-                <p:oleObj spid="_x0000_s33838" name="think-cell Slide" r:id="rId5" imgW="270" imgH="270" progId="TCLayout.ActiveDocument.1">
+                <p:oleObj spid="_x0000_s33839" name="think-cell Slide" r:id="rId5" imgW="270" imgH="270" progId="TCLayout.ActiveDocument.1">
                   <p:embed/>
                 </p:oleObj>
               </mc:Choice>
@@ -14153,7 +14153,7 @@
           <a:graphicData uri="http://schemas.openxmlformats.org/presentationml/2006/ole">
             <mc:AlternateContent xmlns:mc="http://schemas.openxmlformats.org/markup-compatibility/2006">
               <mc:Choice xmlns:v="urn:schemas-microsoft-com:vml" Requires="v">
-                <p:oleObj spid="_x0000_s42002" name="think-cell Slide" r:id="rId5" imgW="270" imgH="270" progId="TCLayout.ActiveDocument.1">
+                <p:oleObj spid="_x0000_s42003" name="think-cell Slide" r:id="rId5" imgW="270" imgH="270" progId="TCLayout.ActiveDocument.1">
                   <p:embed/>
                 </p:oleObj>
               </mc:Choice>
@@ -16690,7 +16690,7 @@
           <a:graphicData uri="http://schemas.openxmlformats.org/presentationml/2006/ole">
             <mc:AlternateContent xmlns:mc="http://schemas.openxmlformats.org/markup-compatibility/2006">
               <mc:Choice xmlns:v="urn:schemas-microsoft-com:vml" Requires="v">
-                <p:oleObj spid="_x0000_s6300" name="think-cell Slide" r:id="rId5" imgW="270" imgH="270" progId="TCLayout.ActiveDocument.1">
+                <p:oleObj spid="_x0000_s6301" name="think-cell Slide" r:id="rId5" imgW="270" imgH="270" progId="TCLayout.ActiveDocument.1">
                   <p:embed/>
                 </p:oleObj>
               </mc:Choice>
@@ -17961,7 +17961,7 @@
           <a:graphicData uri="http://schemas.openxmlformats.org/presentationml/2006/ole">
             <mc:AlternateContent xmlns:mc="http://schemas.openxmlformats.org/markup-compatibility/2006">
               <mc:Choice xmlns:v="urn:schemas-microsoft-com:vml" Requires="v">
-                <p:oleObj spid="_x0000_s39957" name="think-cell Slide" r:id="rId5" imgW="270" imgH="270" progId="TCLayout.ActiveDocument.1">
+                <p:oleObj spid="_x0000_s39958" name="think-cell Slide" r:id="rId5" imgW="270" imgH="270" progId="TCLayout.ActiveDocument.1">
                   <p:embed/>
                 </p:oleObj>
               </mc:Choice>
@@ -19540,6 +19540,30 @@
       </p:grpSpPr>
       <p:pic>
         <p:nvPicPr>
+          <p:cNvPr id="4" name="Picture 3"/>
+          <p:cNvPicPr>
+            <a:picLocks noChangeAspect="1"/>
+          </p:cNvPicPr>
+          <p:nvPr/>
+        </p:nvPicPr>
+        <p:blipFill>
+          <a:blip r:embed="rId2"/>
+          <a:stretch>
+            <a:fillRect/>
+          </a:stretch>
+        </p:blipFill>
+        <p:spPr>
+          <a:xfrm>
+            <a:off x="412730" y="2535381"/>
+            <a:ext cx="4428211" cy="1955314"/>
+          </a:xfrm>
+          <a:prstGeom prst="rect">
+            <a:avLst/>
+          </a:prstGeom>
+        </p:spPr>
+      </p:pic>
+      <p:pic>
+        <p:nvPicPr>
           <p:cNvPr id="6" name="Picture 5"/>
           <p:cNvPicPr>
             <a:picLocks noChangeAspect="1"/>
@@ -19547,7 +19571,7 @@
           <p:nvPr/>
         </p:nvPicPr>
         <p:blipFill>
-          <a:blip r:embed="rId2"/>
+          <a:blip r:embed="rId3"/>
           <a:stretch>
             <a:fillRect/>
           </a:stretch>
@@ -19626,7 +19650,7 @@
           <p:nvPr/>
         </p:nvPicPr>
         <p:blipFill>
-          <a:blip r:embed="rId3"/>
+          <a:blip r:embed="rId4"/>
           <a:stretch>
             <a:fillRect/>
           </a:stretch>
@@ -19635,30 +19659,6 @@
           <a:xfrm>
             <a:off x="3966883" y="2780880"/>
             <a:ext cx="4652684" cy="1902329"/>
-          </a:xfrm>
-          <a:prstGeom prst="rect">
-            <a:avLst/>
-          </a:prstGeom>
-        </p:spPr>
-      </p:pic>
-      <p:pic>
-        <p:nvPicPr>
-          <p:cNvPr id="7" name="Picture 6"/>
-          <p:cNvPicPr>
-            <a:picLocks noChangeAspect="1"/>
-          </p:cNvPicPr>
-          <p:nvPr/>
-        </p:nvPicPr>
-        <p:blipFill>
-          <a:blip r:embed="rId4"/>
-          <a:stretch>
-            <a:fillRect/>
-          </a:stretch>
-        </p:blipFill>
-        <p:spPr>
-          <a:xfrm>
-            <a:off x="412731" y="2498905"/>
-            <a:ext cx="3713482" cy="1717585"/>
           </a:xfrm>
           <a:prstGeom prst="rect">
             <a:avLst/>
@@ -19720,7 +19720,7 @@
           <a:graphicData uri="http://schemas.openxmlformats.org/presentationml/2006/ole">
             <mc:AlternateContent xmlns:mc="http://schemas.openxmlformats.org/markup-compatibility/2006">
               <mc:Choice xmlns:v="urn:schemas-microsoft-com:vml" Requires="v">
-                <p:oleObj spid="_x0000_s31786" name="think-cell Slide" r:id="rId109" imgW="270" imgH="270" progId="TCLayout.ActiveDocument.1">
+                <p:oleObj spid="_x0000_s31787" name="think-cell Slide" r:id="rId109" imgW="270" imgH="270" progId="TCLayout.ActiveDocument.1">
                   <p:embed/>
                 </p:oleObj>
               </mc:Choice>
@@ -31139,7 +31139,7 @@
           <a:graphicData uri="http://schemas.openxmlformats.org/presentationml/2006/ole">
             <mc:AlternateContent xmlns:mc="http://schemas.openxmlformats.org/markup-compatibility/2006">
               <mc:Choice xmlns:v="urn:schemas-microsoft-com:vml" Requires="v">
-                <p:oleObj spid="_x0000_s43023" name="think-cell Slide" r:id="rId5" imgW="270" imgH="270" progId="TCLayout.ActiveDocument.1">
+                <p:oleObj spid="_x0000_s43024" name="think-cell Slide" r:id="rId5" imgW="270" imgH="270" progId="TCLayout.ActiveDocument.1">
                   <p:embed/>
                 </p:oleObj>
               </mc:Choice>

</xml_diff>